<commit_message>
update module 4 on alignment free methods
</commit_message>
<xml_diff>
--- a/LectureFiles/cbw/2018/RNASeq_Module4_Lecture.pptx
+++ b/LectureFiles/cbw/2018/RNASeq_Module4_Lecture.pptx
@@ -5,10 +5,10 @@
     <p:sldMasterId id="2147483648" r:id="rId1"/>
   </p:sldMasterIdLst>
   <p:notesMasterIdLst>
-    <p:notesMasterId r:id="rId8"/>
+    <p:notesMasterId r:id="rId13"/>
   </p:notesMasterIdLst>
   <p:handoutMasterIdLst>
-    <p:handoutMasterId r:id="rId9"/>
+    <p:handoutMasterId r:id="rId14"/>
   </p:handoutMasterIdLst>
   <p:sldIdLst>
     <p:sldId id="341" r:id="rId2"/>
@@ -16,7 +16,12 @@
     <p:sldId id="257" r:id="rId4"/>
     <p:sldId id="514" r:id="rId5"/>
     <p:sldId id="515" r:id="rId6"/>
-    <p:sldId id="512" r:id="rId7"/>
+    <p:sldId id="516" r:id="rId7"/>
+    <p:sldId id="517" r:id="rId8"/>
+    <p:sldId id="519" r:id="rId9"/>
+    <p:sldId id="518" r:id="rId10"/>
+    <p:sldId id="520" r:id="rId11"/>
+    <p:sldId id="512" r:id="rId12"/>
   </p:sldIdLst>
   <p:sldSz cx="9144000" cy="6858000" type="screen4x3"/>
   <p:notesSz cx="7315200" cy="9601200"/>
@@ -255,7 +260,7 @@
               <a:pPr>
                 <a:defRPr/>
               </a:pPr>
-              <a:t>5/22/18</a:t>
+              <a:t>5/28/18</a:t>
             </a:fld>
             <a:endParaRPr lang="en-US"/>
           </a:p>
@@ -470,7 +475,7 @@
               <a:pPr>
                 <a:defRPr/>
               </a:pPr>
-              <a:t>5/22/18</a:t>
+              <a:t>5/28/18</a:t>
             </a:fld>
             <a:endParaRPr lang="en-US"/>
           </a:p>
@@ -1066,6 +1071,208 @@
 </p:notes>
 </file>
 
+<file path=ppt/notesSlides/notesSlide4.xml><?xml version="1.0" encoding="utf-8"?>
+<p:notes xmlns:a="http://schemas.openxmlformats.org/drawingml/2006/main" xmlns:r="http://schemas.openxmlformats.org/officeDocument/2006/relationships" xmlns:p="http://schemas.openxmlformats.org/presentationml/2006/main">
+  <p:cSld>
+    <p:spTree>
+      <p:nvGrpSpPr>
+        <p:cNvPr id="1" name=""/>
+        <p:cNvGrpSpPr/>
+        <p:nvPr/>
+      </p:nvGrpSpPr>
+      <p:grpSpPr>
+        <a:xfrm>
+          <a:off x="0" y="0"/>
+          <a:ext cx="0" cy="0"/>
+          <a:chOff x="0" y="0"/>
+          <a:chExt cx="0" cy="0"/>
+        </a:xfrm>
+      </p:grpSpPr>
+      <p:sp>
+        <p:nvSpPr>
+          <p:cNvPr id="2" name="Slide Image Placeholder 1"/>
+          <p:cNvSpPr>
+            <a:spLocks noGrp="1" noRot="1" noChangeAspect="1"/>
+          </p:cNvSpPr>
+          <p:nvPr>
+            <p:ph type="sldImg"/>
+          </p:nvPr>
+        </p:nvSpPr>
+        <p:spPr/>
+      </p:sp>
+      <p:sp>
+        <p:nvSpPr>
+          <p:cNvPr id="3" name="Notes Placeholder 2"/>
+          <p:cNvSpPr>
+            <a:spLocks noGrp="1"/>
+          </p:cNvSpPr>
+          <p:nvPr>
+            <p:ph type="body" idx="1"/>
+          </p:nvPr>
+        </p:nvSpPr>
+        <p:spPr/>
+        <p:txBody>
+          <a:bodyPr/>
+          <a:lstStyle/>
+          <a:p>
+            <a:pPr marL="171450" indent="-171450">
+              <a:buFontTx/>
+              <a:buChar char="-"/>
+            </a:pPr>
+            <a:r>
+              <a:rPr lang="en-US" dirty="0" smtClean="0"/>
+              <a:t>As</a:t>
+            </a:r>
+            <a:r>
+              <a:rPr lang="en-US" baseline="0" dirty="0" smtClean="0"/>
+              <a:t> k-</a:t>
+            </a:r>
+            <a:r>
+              <a:rPr lang="en-US" baseline="0" dirty="0" err="1" smtClean="0"/>
+              <a:t>mers</a:t>
+            </a:r>
+            <a:r>
+              <a:rPr lang="en-US" baseline="0" dirty="0" smtClean="0"/>
+              <a:t> get longer, there are more possible unique combinations.  For k-</a:t>
+            </a:r>
+            <a:r>
+              <a:rPr lang="en-US" baseline="0" dirty="0" err="1" smtClean="0"/>
+              <a:t>mers</a:t>
+            </a:r>
+            <a:r>
+              <a:rPr lang="en-US" baseline="0" dirty="0" smtClean="0"/>
+              <a:t> representing strings of DNA sequence there are 4^k possible unique k-</a:t>
+            </a:r>
+            <a:r>
+              <a:rPr lang="en-US" baseline="0" dirty="0" err="1" smtClean="0"/>
+              <a:t>mers</a:t>
+            </a:r>
+            <a:r>
+              <a:rPr lang="en-US" baseline="0" dirty="0" smtClean="0"/>
+              <a:t> where k is the length of the k-mer.</a:t>
+            </a:r>
+          </a:p>
+          <a:p>
+            <a:pPr marL="171450" indent="-171450">
+              <a:buFontTx/>
+              <a:buChar char="-"/>
+            </a:pPr>
+            <a:r>
+              <a:rPr lang="en-US" baseline="0" dirty="0" smtClean="0"/>
+              <a:t>Alignment free transcript abundance estimation methods obtain fast performance in part by keeping an index of k-</a:t>
+            </a:r>
+            <a:r>
+              <a:rPr lang="en-US" baseline="0" dirty="0" err="1" smtClean="0"/>
+              <a:t>mers</a:t>
+            </a:r>
+            <a:r>
+              <a:rPr lang="en-US" baseline="0" dirty="0" smtClean="0"/>
+              <a:t> in memory.  Longer k-</a:t>
+            </a:r>
+            <a:r>
+              <a:rPr lang="en-US" baseline="0" dirty="0" err="1" smtClean="0"/>
+              <a:t>mers</a:t>
+            </a:r>
+            <a:r>
+              <a:rPr lang="en-US" baseline="0" dirty="0" smtClean="0"/>
+              <a:t> require more memory.</a:t>
+            </a:r>
+          </a:p>
+          <a:p>
+            <a:pPr marL="171450" indent="-171450">
+              <a:buFontTx/>
+              <a:buChar char="-"/>
+            </a:pPr>
+            <a:r>
+              <a:rPr lang="en-US" baseline="0" dirty="0" smtClean="0"/>
+              <a:t>K-</a:t>
+            </a:r>
+            <a:r>
+              <a:rPr lang="en-US" baseline="0" dirty="0" err="1" smtClean="0"/>
+              <a:t>mer</a:t>
+            </a:r>
+            <a:r>
+              <a:rPr lang="en-US" baseline="0" dirty="0" smtClean="0"/>
+              <a:t> length must be shorter than read and transcript lengths to be useful</a:t>
+            </a:r>
+          </a:p>
+          <a:p>
+            <a:pPr marL="171450" indent="-171450">
+              <a:buFontTx/>
+              <a:buChar char="-"/>
+            </a:pPr>
+            <a:r>
+              <a:rPr lang="en-US" baseline="0" dirty="0" smtClean="0"/>
+              <a:t>Default k-</a:t>
+            </a:r>
+            <a:r>
+              <a:rPr lang="en-US" baseline="0" dirty="0" err="1" smtClean="0"/>
+              <a:t>mer</a:t>
+            </a:r>
+            <a:r>
+              <a:rPr lang="en-US" baseline="0" dirty="0" smtClean="0"/>
+              <a:t> length for </a:t>
+            </a:r>
+            <a:r>
+              <a:rPr lang="en-US" baseline="0" dirty="0" err="1" smtClean="0"/>
+              <a:t>Kallisto</a:t>
+            </a:r>
+            <a:r>
+              <a:rPr lang="en-US" baseline="0" dirty="0" smtClean="0"/>
+              <a:t> is 31</a:t>
+            </a:r>
+          </a:p>
+          <a:p>
+            <a:pPr marL="171450" indent="-171450">
+              <a:buFontTx/>
+              <a:buChar char="-"/>
+            </a:pPr>
+            <a:endParaRPr lang="en-US" dirty="0"/>
+          </a:p>
+        </p:txBody>
+      </p:sp>
+      <p:sp>
+        <p:nvSpPr>
+          <p:cNvPr id="4" name="Slide Number Placeholder 3"/>
+          <p:cNvSpPr>
+            <a:spLocks noGrp="1"/>
+          </p:cNvSpPr>
+          <p:nvPr>
+            <p:ph type="sldNum" sz="quarter" idx="10"/>
+          </p:nvPr>
+        </p:nvSpPr>
+        <p:spPr/>
+        <p:txBody>
+          <a:bodyPr/>
+          <a:lstStyle/>
+          <a:p>
+            <a:pPr>
+              <a:defRPr/>
+            </a:pPr>
+            <a:fld id="{F3969550-FBCF-404B-9FAA-7B1DCDF2C4FF}" type="slidenum">
+              <a:rPr lang="en-US" smtClean="0"/>
+              <a:pPr>
+                <a:defRPr/>
+              </a:pPr>
+              <a:t>6</a:t>
+            </a:fld>
+            <a:endParaRPr lang="en-US"/>
+          </a:p>
+        </p:txBody>
+      </p:sp>
+    </p:spTree>
+    <p:extLst>
+      <p:ext uri="{BB962C8B-B14F-4D97-AF65-F5344CB8AC3E}">
+        <p14:creationId xmlns:p14="http://schemas.microsoft.com/office/powerpoint/2010/main" val="3053102900"/>
+      </p:ext>
+    </p:extLst>
+  </p:cSld>
+  <p:clrMapOvr>
+    <a:masterClrMapping/>
+  </p:clrMapOvr>
+</p:notes>
+</file>
+
 <file path=ppt/slideLayouts/slideLayout1.xml><?xml version="1.0" encoding="utf-8"?>
 <p:sldLayout xmlns:a="http://schemas.openxmlformats.org/drawingml/2006/main" xmlns:r="http://schemas.openxmlformats.org/officeDocument/2006/relationships" xmlns:p="http://schemas.openxmlformats.org/presentationml/2006/main" preserve="1" userDrawn="1">
   <p:cSld name="Title">
@@ -3513,7 +3720,7 @@
               <a:pPr>
                 <a:defRPr/>
               </a:pPr>
-              <a:t>5/22/18</a:t>
+              <a:t>5/28/18</a:t>
             </a:fld>
             <a:endParaRPr lang="en-US"/>
           </a:p>
@@ -4128,6 +4335,199 @@
 </p:sld>
 </file>
 
+<file path=ppt/slides/slide10.xml><?xml version="1.0" encoding="utf-8"?>
+<p:sld xmlns:a="http://schemas.openxmlformats.org/drawingml/2006/main" xmlns:r="http://schemas.openxmlformats.org/officeDocument/2006/relationships" xmlns:p="http://schemas.openxmlformats.org/presentationml/2006/main">
+  <p:cSld>
+    <p:spTree>
+      <p:nvGrpSpPr>
+        <p:cNvPr id="1" name=""/>
+        <p:cNvGrpSpPr/>
+        <p:nvPr/>
+      </p:nvGrpSpPr>
+      <p:grpSpPr>
+        <a:xfrm>
+          <a:off x="0" y="0"/>
+          <a:ext cx="0" cy="0"/>
+          <a:chOff x="0" y="0"/>
+          <a:chExt cx="0" cy="0"/>
+        </a:xfrm>
+      </p:grpSpPr>
+      <p:sp>
+        <p:nvSpPr>
+          <p:cNvPr id="2" name="Title 1"/>
+          <p:cNvSpPr>
+            <a:spLocks noGrp="1"/>
+          </p:cNvSpPr>
+          <p:nvPr>
+            <p:ph type="title"/>
+          </p:nvPr>
+        </p:nvSpPr>
+        <p:spPr>
+          <a:xfrm>
+            <a:off x="152400" y="44624"/>
+            <a:ext cx="8839200" cy="1143000"/>
+          </a:xfrm>
+        </p:spPr>
+        <p:txBody>
+          <a:bodyPr/>
+          <a:lstStyle/>
+          <a:p>
+            <a:r>
+              <a:rPr lang="en-US" dirty="0" smtClean="0"/>
+              <a:t>Which is best?</a:t>
+            </a:r>
+            <a:endParaRPr lang="en-US" dirty="0"/>
+          </a:p>
+        </p:txBody>
+      </p:sp>
+      <p:sp>
+        <p:nvSpPr>
+          <p:cNvPr id="3" name="Content Placeholder 2"/>
+          <p:cNvSpPr>
+            <a:spLocks noGrp="1"/>
+          </p:cNvSpPr>
+          <p:nvPr>
+            <p:ph idx="1"/>
+          </p:nvPr>
+        </p:nvSpPr>
+        <p:spPr/>
+        <p:txBody>
+          <a:bodyPr/>
+          <a:lstStyle/>
+          <a:p>
+            <a:r>
+              <a:rPr lang="en-US" dirty="0" smtClean="0"/>
+              <a:t>Somewhat controversial </a:t>
+            </a:r>
+            <a:r>
+              <a:rPr lang="mr-IN" dirty="0" smtClean="0"/>
+              <a:t>…</a:t>
+            </a:r>
+            <a:endParaRPr lang="en-US" dirty="0" smtClean="0"/>
+          </a:p>
+          <a:p>
+            <a:r>
+              <a:rPr lang="en-US" dirty="0">
+                <a:hlinkClick r:id="rId2"/>
+              </a:rPr>
+              <a:t>https://liorpachter.wordpress.com/2017/08/02/how-not-to-perform-a-differential-expression-analysis-or-science</a:t>
+            </a:r>
+            <a:r>
+              <a:rPr lang="en-US" dirty="0" smtClean="0">
+                <a:hlinkClick r:id="rId2"/>
+              </a:rPr>
+              <a:t>/</a:t>
+            </a:r>
+            <a:r>
+              <a:rPr lang="en-US" dirty="0" smtClean="0"/>
+              <a:t> </a:t>
+            </a:r>
+          </a:p>
+          <a:p>
+            <a:endParaRPr lang="en-US" dirty="0" smtClean="0"/>
+          </a:p>
+          <a:p>
+            <a:r>
+              <a:rPr lang="en-US" dirty="0" smtClean="0"/>
+              <a:t>Various sources suggest that Salmon, </a:t>
+            </a:r>
+            <a:r>
+              <a:rPr lang="en-US" dirty="0" err="1" smtClean="0"/>
+              <a:t>Kallisto</a:t>
+            </a:r>
+            <a:r>
+              <a:rPr lang="en-US" dirty="0" smtClean="0"/>
+              <a:t>, and Sailfish  results are quite comparable</a:t>
+            </a:r>
+          </a:p>
+          <a:p>
+            <a:r>
+              <a:rPr lang="en-US" dirty="0" smtClean="0"/>
+              <a:t>Usability, documentation, and supporting downstream tools could be used to decide</a:t>
+            </a:r>
+            <a:endParaRPr lang="en-US" dirty="0"/>
+          </a:p>
+        </p:txBody>
+      </p:sp>
+    </p:spTree>
+    <p:extLst>
+      <p:ext uri="{BB962C8B-B14F-4D97-AF65-F5344CB8AC3E}">
+        <p14:creationId xmlns:p14="http://schemas.microsoft.com/office/powerpoint/2010/main" val="104811177"/>
+      </p:ext>
+    </p:extLst>
+  </p:cSld>
+  <p:clrMapOvr>
+    <a:masterClrMapping/>
+  </p:clrMapOvr>
+</p:sld>
+</file>
+
+<file path=ppt/slides/slide11.xml><?xml version="1.0" encoding="utf-8"?>
+<p:sld xmlns:a="http://schemas.openxmlformats.org/drawingml/2006/main" xmlns:r="http://schemas.openxmlformats.org/officeDocument/2006/relationships" xmlns:p="http://schemas.openxmlformats.org/presentationml/2006/main">
+  <p:cSld>
+    <p:spTree>
+      <p:nvGrpSpPr>
+        <p:cNvPr id="1" name=""/>
+        <p:cNvGrpSpPr/>
+        <p:nvPr/>
+      </p:nvGrpSpPr>
+      <p:grpSpPr>
+        <a:xfrm>
+          <a:off x="0" y="0"/>
+          <a:ext cx="0" cy="0"/>
+          <a:chOff x="0" y="0"/>
+          <a:chExt cx="0" cy="0"/>
+        </a:xfrm>
+      </p:grpSpPr>
+      <p:sp>
+        <p:nvSpPr>
+          <p:cNvPr id="15361" name="Content Placeholder 3"/>
+          <p:cNvSpPr>
+            <a:spLocks noGrp="1"/>
+          </p:cNvSpPr>
+          <p:nvPr>
+            <p:ph idx="1"/>
+          </p:nvPr>
+        </p:nvSpPr>
+        <p:spPr>
+          <a:xfrm>
+            <a:off x="152400" y="2667000"/>
+            <a:ext cx="8839200" cy="1600200"/>
+          </a:xfrm>
+        </p:spPr>
+        <p:txBody>
+          <a:bodyPr/>
+          <a:lstStyle/>
+          <a:p>
+            <a:pPr algn="ctr">
+              <a:buFont typeface="Arial" charset="0"/>
+              <a:buNone/>
+            </a:pPr>
+            <a:r>
+              <a:rPr lang="en-US" sz="4400">
+                <a:latin typeface="Calibri" charset="0"/>
+                <a:ea typeface="ＭＳ Ｐゴシック" charset="0"/>
+              </a:rPr>
+              <a:t>We are on a Coffee Break &amp; Networking Session</a:t>
+            </a:r>
+          </a:p>
+        </p:txBody>
+      </p:sp>
+    </p:spTree>
+  </p:cSld>
+  <p:clrMapOvr>
+    <a:masterClrMapping/>
+  </p:clrMapOvr>
+  <p:timing>
+    <p:tnLst>
+      <p:par>
+        <p:cTn xmlns:p14="http://schemas.microsoft.com/office/powerpoint/2010/main" id="1" dur="indefinite" restart="never" nodeType="tmRoot"/>
+      </p:par>
+    </p:tnLst>
+  </p:timing>
+</p:sld>
+</file>
+
 <file path=ppt/slides/slide2.xml><?xml version="1.0" encoding="utf-8"?>
 <p:sld xmlns:a="http://schemas.openxmlformats.org/drawingml/2006/main" xmlns:r="http://schemas.openxmlformats.org/officeDocument/2006/relationships" xmlns:p="http://schemas.openxmlformats.org/presentationml/2006/main">
   <p:cSld>
@@ -5220,7 +5620,7 @@
           <a:lstStyle/>
           <a:p>
             <a:r>
-              <a:rPr lang="en-US">
+              <a:rPr lang="en-US" dirty="0">
                 <a:latin typeface="Calibri" charset="0"/>
                 <a:ea typeface="ＭＳ Ｐゴシック" charset="0"/>
               </a:rPr>
@@ -5552,20 +5952,21 @@
             <p:ph type="title"/>
           </p:nvPr>
         </p:nvSpPr>
-        <p:spPr/>
+        <p:spPr>
+          <a:xfrm>
+            <a:off x="152400" y="44624"/>
+            <a:ext cx="8839200" cy="1143000"/>
+          </a:xfrm>
+        </p:spPr>
         <p:txBody>
           <a:bodyPr/>
           <a:lstStyle/>
           <a:p>
             <a:r>
               <a:rPr lang="en-US" dirty="0" smtClean="0"/>
-              <a:t>Learning objectives </a:t>
-            </a:r>
-            <a:r>
-              <a:rPr lang="en-US" smtClean="0"/>
-              <a:t>of module 4 </a:t>
-            </a:r>
-            <a:endParaRPr lang="en-US"/>
+              <a:t>Learning objectives of module 4 </a:t>
+            </a:r>
+            <a:endParaRPr lang="en-US" dirty="0"/>
           </a:p>
         </p:txBody>
       </p:sp>
@@ -5584,7 +5985,62 @@
           <a:bodyPr/>
           <a:lstStyle/>
           <a:p>
-            <a:endParaRPr lang="en-US"/>
+            <a:r>
+              <a:rPr lang="en-US" dirty="0" smtClean="0"/>
+              <a:t>Alignment free estimation of transcript abundance</a:t>
+            </a:r>
+          </a:p>
+          <a:p>
+            <a:endParaRPr lang="en-US" dirty="0" smtClean="0"/>
+          </a:p>
+          <a:p>
+            <a:r>
+              <a:rPr lang="en-US" dirty="0" smtClean="0"/>
+              <a:t>Introduction to k-</a:t>
+            </a:r>
+            <a:r>
+              <a:rPr lang="en-US" dirty="0" err="1" smtClean="0"/>
+              <a:t>mers</a:t>
+            </a:r>
+            <a:endParaRPr lang="en-US" dirty="0" smtClean="0"/>
+          </a:p>
+          <a:p>
+            <a:r>
+              <a:rPr lang="en-US" dirty="0" smtClean="0"/>
+              <a:t>Alignment free tools</a:t>
+            </a:r>
+          </a:p>
+          <a:p>
+            <a:pPr lvl="1"/>
+            <a:r>
+              <a:rPr lang="en-US" dirty="0" smtClean="0"/>
+              <a:t>Sailfish, RNA-Skim, </a:t>
+            </a:r>
+            <a:r>
+              <a:rPr lang="en-US" dirty="0" err="1" smtClean="0"/>
+              <a:t>Kallisto</a:t>
+            </a:r>
+            <a:r>
+              <a:rPr lang="en-US" dirty="0" smtClean="0"/>
+              <a:t>, Salmon</a:t>
+            </a:r>
+          </a:p>
+          <a:p>
+            <a:r>
+              <a:rPr lang="en-US" dirty="0" smtClean="0"/>
+              <a:t>Abundance estimation and differential expression analysis with </a:t>
+            </a:r>
+            <a:r>
+              <a:rPr lang="en-US" dirty="0" err="1" smtClean="0"/>
+              <a:t>Kallisto</a:t>
+            </a:r>
+            <a:r>
+              <a:rPr lang="en-US" dirty="0" smtClean="0"/>
+              <a:t> and Sleuth</a:t>
+            </a:r>
+          </a:p>
+          <a:p>
+            <a:endParaRPr lang="en-US" dirty="0"/>
           </a:p>
         </p:txBody>
       </p:sp>
@@ -5598,6 +6054,13 @@
   <p:clrMapOvr>
     <a:masterClrMapping/>
   </p:clrMapOvr>
+  <p:timing>
+    <p:tnLst>
+      <p:par>
+        <p:cTn xmlns:p14="http://schemas.microsoft.com/office/powerpoint/2010/main" id="1" dur="indefinite" restart="never" nodeType="tmRoot"/>
+      </p:par>
+    </p:tnLst>
+  </p:timing>
 </p:sld>
 </file>
 
@@ -5620,39 +6083,114 @@
       </p:grpSpPr>
       <p:sp>
         <p:nvSpPr>
-          <p:cNvPr id="15361" name="Content Placeholder 3"/>
+          <p:cNvPr id="2" name="Title 1"/>
           <p:cNvSpPr>
             <a:spLocks noGrp="1"/>
           </p:cNvSpPr>
           <p:nvPr>
-            <p:ph idx="1"/>
+            <p:ph type="title"/>
           </p:nvPr>
         </p:nvSpPr>
         <p:spPr>
           <a:xfrm>
-            <a:off x="152400" y="2667000"/>
-            <a:ext cx="8839200" cy="1600200"/>
+            <a:off x="152400" y="44624"/>
+            <a:ext cx="8839200" cy="1143000"/>
           </a:xfrm>
         </p:spPr>
         <p:txBody>
           <a:bodyPr/>
           <a:lstStyle/>
           <a:p>
-            <a:pPr algn="ctr">
-              <a:buFont typeface="Arial" charset="0"/>
-              <a:buNone/>
-            </a:pPr>
-            <a:r>
-              <a:rPr lang="en-US" sz="4400">
-                <a:latin typeface="Calibri" charset="0"/>
-                <a:ea typeface="ＭＳ Ｐゴシック" charset="0"/>
+            <a:r>
+              <a:rPr lang="en-US" dirty="0" smtClean="0"/>
+              <a:t>What is a k-</a:t>
+            </a:r>
+            <a:r>
+              <a:rPr lang="en-US" dirty="0" err="1" smtClean="0"/>
+              <a:t>mer</a:t>
+            </a:r>
+            <a:r>
+              <a:rPr lang="en-US" dirty="0" smtClean="0"/>
+              <a:t>?</a:t>
+            </a:r>
+            <a:endParaRPr lang="en-US" dirty="0"/>
+          </a:p>
+        </p:txBody>
+      </p:sp>
+      <p:pic>
+        <p:nvPicPr>
+          <p:cNvPr id="5" name="Content Placeholder 4" descr="k-mers.png"/>
+          <p:cNvPicPr>
+            <a:picLocks noGrp="1" noChangeAspect="1"/>
+          </p:cNvPicPr>
+          <p:nvPr>
+            <p:ph idx="1"/>
+          </p:nvPr>
+        </p:nvPicPr>
+        <p:blipFill>
+          <a:blip r:embed="rId3" cstate="print">
+            <a:extLst>
+              <a:ext uri="{28A0092B-C50C-407E-A947-70E740481C1C}">
+                <a14:useLocalDpi xmlns:a14="http://schemas.microsoft.com/office/drawing/2010/main" val="0"/>
+              </a:ext>
+            </a:extLst>
+          </a:blip>
+          <a:srcRect l="-1713" r="-1713"/>
+          <a:stretch>
+            <a:fillRect/>
+          </a:stretch>
+        </p:blipFill>
+        <p:spPr>
+          <a:xfrm>
+            <a:off x="152400" y="1081088"/>
+            <a:ext cx="8839200" cy="4724400"/>
+          </a:xfrm>
+        </p:spPr>
+      </p:pic>
+      <p:sp>
+        <p:nvSpPr>
+          <p:cNvPr id="4" name="TextBox 3"/>
+          <p:cNvSpPr txBox="1"/>
+          <p:nvPr/>
+        </p:nvSpPr>
+        <p:spPr>
+          <a:xfrm>
+            <a:off x="226673" y="5877272"/>
+            <a:ext cx="7369663" cy="369332"/>
+          </a:xfrm>
+          <a:prstGeom prst="rect">
+            <a:avLst/>
+          </a:prstGeom>
+          <a:noFill/>
+        </p:spPr>
+        <p:txBody>
+          <a:bodyPr wrap="none" rtlCol="0">
+            <a:spAutoFit/>
+          </a:bodyPr>
+          <a:lstStyle/>
+          <a:p>
+            <a:r>
+              <a:rPr lang="en-US" sz="1800" dirty="0">
+                <a:hlinkClick r:id="rId4"/>
               </a:rPr>
-              <a:t>We are on a Coffee Break &amp; Networking Session</a:t>
-            </a:r>
+              <a:t>https://www.slideshare.net/duruofei/cmsc702-project-final-</a:t>
+            </a:r>
+            <a:r>
+              <a:rPr lang="en-US" sz="1800" dirty="0" smtClean="0">
+                <a:hlinkClick r:id="rId4"/>
+              </a:rPr>
+              <a:t>presentation</a:t>
+            </a:r>
+            <a:endParaRPr lang="en-US" sz="1800" dirty="0"/>
           </a:p>
         </p:txBody>
       </p:sp>
     </p:spTree>
+    <p:extLst>
+      <p:ext uri="{BB962C8B-B14F-4D97-AF65-F5344CB8AC3E}">
+        <p14:creationId xmlns:p14="http://schemas.microsoft.com/office/powerpoint/2010/main" val="577396447"/>
+      </p:ext>
+    </p:extLst>
   </p:cSld>
   <p:clrMapOvr>
     <a:masterClrMapping/>
@@ -5664,6 +6202,647 @@
       </p:par>
     </p:tnLst>
   </p:timing>
+</p:sld>
+</file>
+
+<file path=ppt/slides/slide7.xml><?xml version="1.0" encoding="utf-8"?>
+<p:sld xmlns:a="http://schemas.openxmlformats.org/drawingml/2006/main" xmlns:r="http://schemas.openxmlformats.org/officeDocument/2006/relationships" xmlns:p="http://schemas.openxmlformats.org/presentationml/2006/main">
+  <p:cSld>
+    <p:spTree>
+      <p:nvGrpSpPr>
+        <p:cNvPr id="1" name=""/>
+        <p:cNvGrpSpPr/>
+        <p:nvPr/>
+      </p:nvGrpSpPr>
+      <p:grpSpPr>
+        <a:xfrm>
+          <a:off x="0" y="0"/>
+          <a:ext cx="0" cy="0"/>
+          <a:chOff x="0" y="0"/>
+          <a:chExt cx="0" cy="0"/>
+        </a:xfrm>
+      </p:grpSpPr>
+      <p:sp>
+        <p:nvSpPr>
+          <p:cNvPr id="2" name="Title 1"/>
+          <p:cNvSpPr>
+            <a:spLocks noGrp="1"/>
+          </p:cNvSpPr>
+          <p:nvPr>
+            <p:ph type="title"/>
+          </p:nvPr>
+        </p:nvSpPr>
+        <p:spPr>
+          <a:xfrm>
+            <a:off x="152400" y="-27384"/>
+            <a:ext cx="8839200" cy="1143000"/>
+          </a:xfrm>
+        </p:spPr>
+        <p:txBody>
+          <a:bodyPr/>
+          <a:lstStyle/>
+          <a:p>
+            <a:r>
+              <a:rPr lang="en-US" dirty="0" smtClean="0"/>
+              <a:t>Basic concept of alignment free approaches for transcript abundance</a:t>
+            </a:r>
+            <a:endParaRPr lang="en-US" dirty="0"/>
+          </a:p>
+        </p:txBody>
+      </p:sp>
+      <p:sp>
+        <p:nvSpPr>
+          <p:cNvPr id="3" name="Content Placeholder 2"/>
+          <p:cNvSpPr>
+            <a:spLocks noGrp="1"/>
+          </p:cNvSpPr>
+          <p:nvPr>
+            <p:ph idx="1"/>
+          </p:nvPr>
+        </p:nvSpPr>
+        <p:spPr/>
+        <p:txBody>
+          <a:bodyPr>
+            <a:normAutofit fontScale="85000" lnSpcReduction="20000"/>
+          </a:bodyPr>
+          <a:lstStyle/>
+          <a:p>
+            <a:pPr marL="514350" indent="-514350">
+              <a:buFont typeface="+mj-lt"/>
+              <a:buAutoNum type="arabicPeriod"/>
+            </a:pPr>
+            <a:r>
+              <a:rPr lang="en-US" dirty="0" smtClean="0"/>
+              <a:t>Obtain reference transcript sequences (e.g. Ensembl, </a:t>
+            </a:r>
+            <a:r>
+              <a:rPr lang="en-US" dirty="0" err="1" smtClean="0"/>
+              <a:t>Refseq</a:t>
+            </a:r>
+            <a:r>
+              <a:rPr lang="en-US" dirty="0" smtClean="0"/>
+              <a:t>, or GENCODE)</a:t>
+            </a:r>
+            <a:endParaRPr lang="en-US" dirty="0"/>
+          </a:p>
+          <a:p>
+            <a:pPr marL="514350" indent="-514350">
+              <a:buFont typeface="+mj-lt"/>
+              <a:buAutoNum type="arabicPeriod"/>
+            </a:pPr>
+            <a:r>
+              <a:rPr lang="en-US" dirty="0" smtClean="0"/>
+              <a:t>Build a </a:t>
+            </a:r>
+            <a:r>
+              <a:rPr lang="en-US" b="1" dirty="0" smtClean="0"/>
+              <a:t>k-</a:t>
+            </a:r>
+            <a:r>
+              <a:rPr lang="en-US" b="1" dirty="0" err="1" smtClean="0"/>
+              <a:t>mer</a:t>
+            </a:r>
+            <a:r>
+              <a:rPr lang="en-US" b="1" dirty="0" smtClean="0"/>
+              <a:t> index</a:t>
+            </a:r>
+            <a:r>
+              <a:rPr lang="en-US" dirty="0" smtClean="0"/>
+              <a:t> of all of the k-</a:t>
+            </a:r>
+            <a:r>
+              <a:rPr lang="en-US" dirty="0" err="1" smtClean="0"/>
+              <a:t>mers</a:t>
+            </a:r>
+            <a:r>
+              <a:rPr lang="en-US" dirty="0" smtClean="0"/>
+              <a:t> occurring in each  transcript sequence</a:t>
+            </a:r>
+          </a:p>
+          <a:p>
+            <a:pPr marL="914400" lvl="1" indent="-514350"/>
+            <a:r>
+              <a:rPr lang="en-US" dirty="0" smtClean="0"/>
+              <a:t>Store each k-</a:t>
+            </a:r>
+            <a:r>
+              <a:rPr lang="en-US" dirty="0" err="1" smtClean="0"/>
+              <a:t>mer</a:t>
+            </a:r>
+            <a:r>
+              <a:rPr lang="en-US" dirty="0" smtClean="0"/>
+              <a:t> and its position within the transcript. “hashing”</a:t>
+            </a:r>
+          </a:p>
+          <a:p>
+            <a:pPr marL="514350" indent="-514350">
+              <a:buFont typeface="+mj-lt"/>
+              <a:buAutoNum type="arabicPeriod"/>
+            </a:pPr>
+            <a:r>
+              <a:rPr lang="en-US" dirty="0" smtClean="0"/>
+              <a:t>Parse all RNA-seq reads and count how many times each k-</a:t>
+            </a:r>
+            <a:r>
+              <a:rPr lang="en-US" dirty="0" err="1" smtClean="0"/>
+              <a:t>mer</a:t>
+            </a:r>
+            <a:r>
+              <a:rPr lang="en-US" dirty="0" smtClean="0"/>
+              <a:t> occurs within each read</a:t>
+            </a:r>
+          </a:p>
+          <a:p>
+            <a:pPr marL="914400" lvl="1" indent="-514350"/>
+            <a:r>
+              <a:rPr lang="en-US" dirty="0" smtClean="0"/>
+              <a:t>Model relationship between RNA-seq read k-</a:t>
+            </a:r>
+            <a:r>
+              <a:rPr lang="en-US" dirty="0" err="1" smtClean="0"/>
+              <a:t>mers</a:t>
+            </a:r>
+            <a:r>
+              <a:rPr lang="en-US" dirty="0" smtClean="0"/>
+              <a:t> and the transcript k-</a:t>
+            </a:r>
+            <a:r>
+              <a:rPr lang="en-US" dirty="0" err="1" smtClean="0"/>
+              <a:t>mer</a:t>
+            </a:r>
+            <a:r>
+              <a:rPr lang="en-US" dirty="0" smtClean="0"/>
+              <a:t> index. </a:t>
+            </a:r>
+          </a:p>
+          <a:p>
+            <a:pPr marL="914400" lvl="1" indent="-514350"/>
+            <a:r>
+              <a:rPr lang="en-US" dirty="0" smtClean="0"/>
+              <a:t>What transcript is the most likely source for each read?</a:t>
+            </a:r>
+          </a:p>
+          <a:p>
+            <a:pPr marL="914400" lvl="1" indent="-514350"/>
+            <a:r>
+              <a:rPr lang="en-US" dirty="0" smtClean="0"/>
+              <a:t>Called “</a:t>
+            </a:r>
+            <a:r>
+              <a:rPr lang="en-US" dirty="0" err="1" smtClean="0"/>
+              <a:t>pseudoalignment</a:t>
+            </a:r>
+            <a:r>
+              <a:rPr lang="en-US" dirty="0" smtClean="0"/>
+              <a:t>” , “quasi-mapping”, etc.</a:t>
+            </a:r>
+          </a:p>
+          <a:p>
+            <a:pPr marL="514350" indent="-514350">
+              <a:buFont typeface="+mj-lt"/>
+              <a:buAutoNum type="arabicPeriod"/>
+            </a:pPr>
+            <a:r>
+              <a:rPr lang="en-US" dirty="0" smtClean="0"/>
+              <a:t>Handle sequencing errors, isoforms, ambiguity, and determine abundance estimates</a:t>
+            </a:r>
+          </a:p>
+          <a:p>
+            <a:pPr marL="914400" lvl="1" indent="-514350"/>
+            <a:r>
+              <a:rPr lang="en-US" dirty="0" smtClean="0"/>
+              <a:t>Transcriptome de </a:t>
+            </a:r>
+            <a:r>
+              <a:rPr lang="en-US" dirty="0" err="1" smtClean="0"/>
+              <a:t>Bruijn</a:t>
+            </a:r>
+            <a:r>
+              <a:rPr lang="en-US" dirty="0" smtClean="0"/>
+              <a:t> graphs, likelihood function, expectation maximization, etc.</a:t>
+            </a:r>
+          </a:p>
+          <a:p>
+            <a:pPr marL="914400" lvl="1" indent="-514350"/>
+            <a:endParaRPr lang="en-US" dirty="0"/>
+          </a:p>
+        </p:txBody>
+      </p:sp>
+    </p:spTree>
+    <p:extLst>
+      <p:ext uri="{BB962C8B-B14F-4D97-AF65-F5344CB8AC3E}">
+        <p14:creationId xmlns:p14="http://schemas.microsoft.com/office/powerpoint/2010/main" val="587122783"/>
+      </p:ext>
+    </p:extLst>
+  </p:cSld>
+  <p:clrMapOvr>
+    <a:masterClrMapping/>
+  </p:clrMapOvr>
+  <p:timing>
+    <p:tnLst>
+      <p:par>
+        <p:cTn xmlns:p14="http://schemas.microsoft.com/office/powerpoint/2010/main" id="1" dur="indefinite" restart="never" nodeType="tmRoot"/>
+      </p:par>
+    </p:tnLst>
+  </p:timing>
+</p:sld>
+</file>
+
+<file path=ppt/slides/slide8.xml><?xml version="1.0" encoding="utf-8"?>
+<p:sld xmlns:a="http://schemas.openxmlformats.org/drawingml/2006/main" xmlns:r="http://schemas.openxmlformats.org/officeDocument/2006/relationships" xmlns:p="http://schemas.openxmlformats.org/presentationml/2006/main">
+  <p:cSld>
+    <p:spTree>
+      <p:nvGrpSpPr>
+        <p:cNvPr id="1" name=""/>
+        <p:cNvGrpSpPr/>
+        <p:nvPr/>
+      </p:nvGrpSpPr>
+      <p:grpSpPr>
+        <a:xfrm>
+          <a:off x="0" y="0"/>
+          <a:ext cx="0" cy="0"/>
+          <a:chOff x="0" y="0"/>
+          <a:chExt cx="0" cy="0"/>
+        </a:xfrm>
+      </p:grpSpPr>
+      <p:sp>
+        <p:nvSpPr>
+          <p:cNvPr id="2" name="Title 1"/>
+          <p:cNvSpPr>
+            <a:spLocks noGrp="1"/>
+          </p:cNvSpPr>
+          <p:nvPr>
+            <p:ph type="title"/>
+          </p:nvPr>
+        </p:nvSpPr>
+        <p:spPr>
+          <a:xfrm>
+            <a:off x="152400" y="44624"/>
+            <a:ext cx="8839200" cy="1143000"/>
+          </a:xfrm>
+        </p:spPr>
+        <p:txBody>
+          <a:bodyPr/>
+          <a:lstStyle/>
+          <a:p>
+            <a:r>
+              <a:rPr lang="en-US" dirty="0" smtClean="0"/>
+              <a:t>Advantages/disadvantages of alignment free approaches</a:t>
+            </a:r>
+            <a:endParaRPr lang="en-US" dirty="0"/>
+          </a:p>
+        </p:txBody>
+      </p:sp>
+      <p:sp>
+        <p:nvSpPr>
+          <p:cNvPr id="3" name="Content Placeholder 2"/>
+          <p:cNvSpPr>
+            <a:spLocks noGrp="1"/>
+          </p:cNvSpPr>
+          <p:nvPr>
+            <p:ph idx="1"/>
+          </p:nvPr>
+        </p:nvSpPr>
+        <p:spPr/>
+        <p:txBody>
+          <a:bodyPr>
+            <a:normAutofit lnSpcReduction="10000"/>
+          </a:bodyPr>
+          <a:lstStyle/>
+          <a:p>
+            <a:r>
+              <a:rPr lang="en-US" dirty="0" smtClean="0"/>
+              <a:t>Advantages</a:t>
+            </a:r>
+          </a:p>
+          <a:p>
+            <a:pPr lvl="1"/>
+            <a:r>
+              <a:rPr lang="en-US" dirty="0" smtClean="0"/>
+              <a:t>Very fast and efficient</a:t>
+            </a:r>
+          </a:p>
+          <a:p>
+            <a:pPr lvl="2"/>
+            <a:r>
+              <a:rPr lang="en-US" dirty="0" smtClean="0"/>
+              <a:t>Similar accuracy to alignment based approach but with much, much shorter run time.</a:t>
+            </a:r>
+          </a:p>
+          <a:p>
+            <a:pPr lvl="1"/>
+            <a:r>
+              <a:rPr lang="en-US" dirty="0"/>
+              <a:t>Do not need a reference genome, only a reference </a:t>
+            </a:r>
+            <a:r>
+              <a:rPr lang="en-US" dirty="0" smtClean="0"/>
+              <a:t>transcriptome</a:t>
+            </a:r>
+          </a:p>
+          <a:p>
+            <a:pPr lvl="1"/>
+            <a:endParaRPr lang="en-US" dirty="0"/>
+          </a:p>
+          <a:p>
+            <a:r>
+              <a:rPr lang="en-US" dirty="0" smtClean="0"/>
+              <a:t>Disadvantages</a:t>
+            </a:r>
+          </a:p>
+          <a:p>
+            <a:pPr lvl="1"/>
+            <a:r>
+              <a:rPr lang="en-US" dirty="0" smtClean="0"/>
+              <a:t>You don’t get a proper BAM file</a:t>
+            </a:r>
+          </a:p>
+          <a:p>
+            <a:pPr lvl="1"/>
+            <a:r>
+              <a:rPr lang="en-US" dirty="0" smtClean="0"/>
+              <a:t>Information in reads with sequence errors may be ignored</a:t>
+            </a:r>
+          </a:p>
+          <a:p>
+            <a:pPr lvl="1"/>
+            <a:r>
+              <a:rPr lang="en-US" dirty="0" smtClean="0"/>
+              <a:t>Limited potential for transcript discovery, variant calling, fusion detection, etc.</a:t>
+            </a:r>
+            <a:endParaRPr lang="en-US" dirty="0"/>
+          </a:p>
+        </p:txBody>
+      </p:sp>
+    </p:spTree>
+    <p:extLst>
+      <p:ext uri="{BB962C8B-B14F-4D97-AF65-F5344CB8AC3E}">
+        <p14:creationId xmlns:p14="http://schemas.microsoft.com/office/powerpoint/2010/main" val="2683267022"/>
+      </p:ext>
+    </p:extLst>
+  </p:cSld>
+  <p:clrMapOvr>
+    <a:masterClrMapping/>
+  </p:clrMapOvr>
+  <p:timing>
+    <p:tnLst>
+      <p:par>
+        <p:cTn xmlns:p14="http://schemas.microsoft.com/office/powerpoint/2010/main" id="1" dur="indefinite" restart="never" nodeType="tmRoot"/>
+      </p:par>
+    </p:tnLst>
+  </p:timing>
+</p:sld>
+</file>
+
+<file path=ppt/slides/slide9.xml><?xml version="1.0" encoding="utf-8"?>
+<p:sld xmlns:a="http://schemas.openxmlformats.org/drawingml/2006/main" xmlns:r="http://schemas.openxmlformats.org/officeDocument/2006/relationships" xmlns:p="http://schemas.openxmlformats.org/presentationml/2006/main">
+  <p:cSld>
+    <p:spTree>
+      <p:nvGrpSpPr>
+        <p:cNvPr id="1" name=""/>
+        <p:cNvGrpSpPr/>
+        <p:nvPr/>
+      </p:nvGrpSpPr>
+      <p:grpSpPr>
+        <a:xfrm>
+          <a:off x="0" y="0"/>
+          <a:ext cx="0" cy="0"/>
+          <a:chOff x="0" y="0"/>
+          <a:chExt cx="0" cy="0"/>
+        </a:xfrm>
+      </p:grpSpPr>
+      <p:sp>
+        <p:nvSpPr>
+          <p:cNvPr id="2" name="Title 1"/>
+          <p:cNvSpPr>
+            <a:spLocks noGrp="1"/>
+          </p:cNvSpPr>
+          <p:nvPr>
+            <p:ph type="title"/>
+          </p:nvPr>
+        </p:nvSpPr>
+        <p:spPr>
+          <a:xfrm>
+            <a:off x="152400" y="44624"/>
+            <a:ext cx="8839200" cy="1143000"/>
+          </a:xfrm>
+        </p:spPr>
+        <p:txBody>
+          <a:bodyPr/>
+          <a:lstStyle/>
+          <a:p>
+            <a:r>
+              <a:rPr lang="en-US" dirty="0" smtClean="0"/>
+              <a:t>Common alignment free tools</a:t>
+            </a:r>
+            <a:endParaRPr lang="en-US" dirty="0"/>
+          </a:p>
+        </p:txBody>
+      </p:sp>
+      <p:sp>
+        <p:nvSpPr>
+          <p:cNvPr id="3" name="Content Placeholder 2"/>
+          <p:cNvSpPr>
+            <a:spLocks noGrp="1"/>
+          </p:cNvSpPr>
+          <p:nvPr>
+            <p:ph idx="1"/>
+          </p:nvPr>
+        </p:nvSpPr>
+        <p:spPr/>
+        <p:txBody>
+          <a:bodyPr>
+            <a:normAutofit fontScale="85000" lnSpcReduction="20000"/>
+          </a:bodyPr>
+          <a:lstStyle/>
+          <a:p>
+            <a:r>
+              <a:rPr lang="en-US" dirty="0" smtClean="0"/>
+              <a:t>Sailfish</a:t>
+            </a:r>
+          </a:p>
+          <a:p>
+            <a:pPr lvl="1"/>
+            <a:r>
+              <a:rPr lang="en-US" dirty="0" smtClean="0"/>
+              <a:t>“Sailfish </a:t>
+            </a:r>
+            <a:r>
+              <a:rPr lang="en-US" dirty="0"/>
+              <a:t>enables alignment-free isoform quantification from RNA-seq reads using lightweight </a:t>
+            </a:r>
+            <a:r>
+              <a:rPr lang="en-US" dirty="0" smtClean="0"/>
+              <a:t>algorithms.” 2014</a:t>
+            </a:r>
+          </a:p>
+          <a:p>
+            <a:pPr lvl="1"/>
+            <a:r>
+              <a:rPr lang="en-US" dirty="0">
+                <a:hlinkClick r:id="rId2"/>
+              </a:rPr>
+              <a:t>https://www.ncbi.nlm.nih.gov/pubmed/</a:t>
+            </a:r>
+            <a:r>
+              <a:rPr lang="en-US" dirty="0" smtClean="0">
+                <a:hlinkClick r:id="rId2"/>
+              </a:rPr>
+              <a:t>24752080</a:t>
+            </a:r>
+            <a:r>
+              <a:rPr lang="en-US" dirty="0" smtClean="0"/>
+              <a:t> </a:t>
+            </a:r>
+          </a:p>
+          <a:p>
+            <a:r>
+              <a:rPr lang="en-US" dirty="0" smtClean="0"/>
+              <a:t>RNA</a:t>
+            </a:r>
+            <a:r>
+              <a:rPr lang="en-US" dirty="0"/>
+              <a:t>-</a:t>
+            </a:r>
+            <a:r>
+              <a:rPr lang="en-US" dirty="0" smtClean="0"/>
+              <a:t>Skim</a:t>
+            </a:r>
+          </a:p>
+          <a:p>
+            <a:pPr lvl="1"/>
+            <a:r>
+              <a:rPr lang="en-US" dirty="0" smtClean="0"/>
+              <a:t>“RNA</a:t>
+            </a:r>
+            <a:r>
+              <a:rPr lang="en-US" dirty="0"/>
+              <a:t>-Skim: a rapid method for RNA-Seq quantification at transcript level</a:t>
+            </a:r>
+            <a:r>
+              <a:rPr lang="en-US" dirty="0" smtClean="0"/>
+              <a:t>.” 2014</a:t>
+            </a:r>
+          </a:p>
+          <a:p>
+            <a:pPr lvl="1"/>
+            <a:r>
+              <a:rPr lang="en-US" dirty="0">
+                <a:hlinkClick r:id="rId3"/>
+              </a:rPr>
+              <a:t>https://www.ncbi.nlm.nih.gov/pubmed/</a:t>
+            </a:r>
+            <a:r>
+              <a:rPr lang="en-US" dirty="0" smtClean="0">
+                <a:hlinkClick r:id="rId3"/>
+              </a:rPr>
+              <a:t>24931995</a:t>
+            </a:r>
+            <a:r>
+              <a:rPr lang="en-US" dirty="0" smtClean="0"/>
+              <a:t> </a:t>
+            </a:r>
+          </a:p>
+          <a:p>
+            <a:r>
+              <a:rPr lang="en-US" dirty="0" err="1" smtClean="0"/>
+              <a:t>Kallisto</a:t>
+            </a:r>
+            <a:endParaRPr lang="en-US" dirty="0" smtClean="0"/>
+          </a:p>
+          <a:p>
+            <a:pPr lvl="1"/>
+            <a:r>
+              <a:rPr lang="en-US" dirty="0" smtClean="0"/>
+              <a:t>“Near</a:t>
+            </a:r>
+            <a:r>
+              <a:rPr lang="en-US" dirty="0"/>
+              <a:t>-optimal probabilistic RNA-seq quantification</a:t>
+            </a:r>
+            <a:r>
+              <a:rPr lang="en-US" dirty="0" smtClean="0"/>
+              <a:t>.” 2016</a:t>
+            </a:r>
+          </a:p>
+          <a:p>
+            <a:pPr lvl="1"/>
+            <a:r>
+              <a:rPr lang="en-US" dirty="0">
+                <a:hlinkClick r:id="rId4"/>
+              </a:rPr>
+              <a:t>https://www.ncbi.nlm.nih.gov/pubmed/</a:t>
+            </a:r>
+            <a:r>
+              <a:rPr lang="en-US" dirty="0" smtClean="0">
+                <a:hlinkClick r:id="rId4"/>
+              </a:rPr>
+              <a:t>27043002</a:t>
+            </a:r>
+            <a:r>
+              <a:rPr lang="en-US" dirty="0" smtClean="0"/>
+              <a:t> </a:t>
+            </a:r>
+            <a:endParaRPr lang="en-US" dirty="0"/>
+          </a:p>
+          <a:p>
+            <a:r>
+              <a:rPr lang="en-US" dirty="0" smtClean="0"/>
+              <a:t>Salmon</a:t>
+            </a:r>
+          </a:p>
+          <a:p>
+            <a:pPr lvl="1"/>
+            <a:r>
+              <a:rPr lang="en-US" dirty="0"/>
+              <a:t>“Salmon provides fast and bias-aware quantification of transcript expression</a:t>
+            </a:r>
+            <a:r>
+              <a:rPr lang="en-US" dirty="0" smtClean="0"/>
+              <a:t>.” 2017</a:t>
+            </a:r>
+          </a:p>
+          <a:p>
+            <a:pPr lvl="1"/>
+            <a:r>
+              <a:rPr lang="en-US" dirty="0" smtClean="0">
+                <a:hlinkClick r:id="rId5"/>
+              </a:rPr>
+              <a:t>https</a:t>
+            </a:r>
+            <a:r>
+              <a:rPr lang="en-US" dirty="0">
+                <a:hlinkClick r:id="rId5"/>
+              </a:rPr>
+              <a:t>://www.ncbi.nlm.nih.gov/pubmed/</a:t>
+            </a:r>
+            <a:r>
+              <a:rPr lang="en-US" dirty="0" smtClean="0">
+                <a:hlinkClick r:id="rId5"/>
+              </a:rPr>
+              <a:t>28263959</a:t>
+            </a:r>
+            <a:r>
+              <a:rPr lang="en-US" dirty="0" smtClean="0"/>
+              <a:t> </a:t>
+            </a:r>
+            <a:endParaRPr lang="en-US" dirty="0"/>
+          </a:p>
+          <a:p>
+            <a:endParaRPr lang="en-US" dirty="0"/>
+          </a:p>
+        </p:txBody>
+      </p:sp>
+    </p:spTree>
+    <p:extLst>
+      <p:ext uri="{BB962C8B-B14F-4D97-AF65-F5344CB8AC3E}">
+        <p14:creationId xmlns:p14="http://schemas.microsoft.com/office/powerpoint/2010/main" val="1074071982"/>
+      </p:ext>
+    </p:extLst>
+  </p:cSld>
+  <p:clrMapOvr>
+    <a:masterClrMapping/>
+  </p:clrMapOvr>
 </p:sld>
 </file>
 

</xml_diff>